<commit_message>
Wichtigste Anforderung + Animationen + Kommentare
</commit_message>
<xml_diff>
--- a/Praktikumsbericht/Abschlusspraesentation.pptx
+++ b/Praktikumsbericht/Abschlusspraesentation.pptx
@@ -111,6 +111,11 @@
       </a:defRPr>
     </a:lvl9pPr>
   </p:defaultTextStyle>
+  <p:extLst>
+    <p:ext uri="{EFAFB233-063F-42B5-8137-9DF3F51BA10A}">
+      <p15:sldGuideLst xmlns:p15="http://schemas.microsoft.com/office/powerpoint/2012/main"/>
+    </p:ext>
+  </p:extLst>
 </p:presentation>
 </file>
 
@@ -196,7 +201,7 @@
           <a:p>
             <a:fld id="{BF4D25C0-465E-4F0F-AA10-6CF3618A97BF}" type="datetimeFigureOut">
               <a:rPr lang="de-DE" smtClean="0"/>
-              <a:t>18.06.2019</a:t>
+              <a:t>19.06.2019</a:t>
             </a:fld>
             <a:endParaRPr lang="de-DE"/>
           </a:p>
@@ -508,6 +513,285 @@
           <a:lstStyle/>
           <a:p>
             <a:r>
+              <a:rPr lang="de-DE" dirty="0"/>
+              <a:t>Unser Programm automatisiert wiederkehrende Aufgaben durch sogenannte </a:t>
+            </a:r>
+            <a:r>
+              <a:rPr lang="de-DE" dirty="0" err="1"/>
+              <a:t>Wrker</a:t>
+            </a:r>
+            <a:endParaRPr lang="de-DE" dirty="0"/>
+          </a:p>
+          <a:p>
+            <a:r>
+              <a:rPr lang="de-DE" dirty="0"/>
+              <a:t>Es dienst dabei nur als Framework, wobei es die </a:t>
+            </a:r>
+            <a:r>
+              <a:rPr lang="de-DE" dirty="0" err="1"/>
+              <a:t>Worker</a:t>
+            </a:r>
+            <a:r>
+              <a:rPr lang="de-DE" dirty="0"/>
+              <a:t> nur Organisiert</a:t>
+            </a:r>
+          </a:p>
+          <a:p>
+            <a:r>
+              <a:rPr lang="de-DE" dirty="0"/>
+              <a:t>Man muss die Klasse </a:t>
+            </a:r>
+            <a:r>
+              <a:rPr lang="de-DE" dirty="0" err="1"/>
+              <a:t>Worker</a:t>
+            </a:r>
+            <a:r>
+              <a:rPr lang="de-DE" dirty="0"/>
+              <a:t> dabei selber Ableiten und selber Programmieren was genau erledigt werden soll</a:t>
+            </a:r>
+          </a:p>
+          <a:p>
+            <a:r>
+              <a:rPr lang="de-DE" dirty="0"/>
+              <a:t>Unser Projekt ist deshalb Quelloffen</a:t>
+            </a:r>
+          </a:p>
+          <a:p>
+            <a:r>
+              <a:rPr lang="de-DE" dirty="0"/>
+              <a:t>Wir haben eine Beispielimplementierung: </a:t>
+            </a:r>
+            <a:r>
+              <a:rPr lang="de-DE" dirty="0" err="1"/>
+              <a:t>SyncWorker</a:t>
+            </a:r>
+            <a:r>
+              <a:rPr lang="de-DE" dirty="0"/>
+              <a:t>, der 2 Ordner Synchron hält</a:t>
+            </a:r>
+          </a:p>
+        </p:txBody>
+      </p:sp>
+      <p:sp>
+        <p:nvSpPr>
+          <p:cNvPr id="4" name="Foliennummernplatzhalter 3"/>
+          <p:cNvSpPr>
+            <a:spLocks noGrp="1"/>
+          </p:cNvSpPr>
+          <p:nvPr>
+            <p:ph type="sldNum" sz="quarter" idx="5"/>
+          </p:nvPr>
+        </p:nvSpPr>
+        <p:spPr/>
+        <p:txBody>
+          <a:bodyPr/>
+          <a:lstStyle/>
+          <a:p>
+            <a:fld id="{742BFD6F-DD94-4948-BBA6-AD5AE625A179}" type="slidenum">
+              <a:rPr lang="de-DE" smtClean="0"/>
+              <a:t>1</a:t>
+            </a:fld>
+            <a:endParaRPr lang="de-DE"/>
+          </a:p>
+        </p:txBody>
+      </p:sp>
+    </p:spTree>
+    <p:extLst>
+      <p:ext uri="{BB962C8B-B14F-4D97-AF65-F5344CB8AC3E}">
+        <p14:creationId xmlns:p14="http://schemas.microsoft.com/office/powerpoint/2010/main" val="2321326267"/>
+      </p:ext>
+    </p:extLst>
+  </p:cSld>
+  <p:clrMapOvr>
+    <a:masterClrMapping/>
+  </p:clrMapOvr>
+</p:notes>
+</file>
+
+<file path=ppt/notesSlides/notesSlide2.xml><?xml version="1.0" encoding="utf-8"?>
+<p:notes xmlns:a="http://schemas.openxmlformats.org/drawingml/2006/main" xmlns:r="http://schemas.openxmlformats.org/officeDocument/2006/relationships" xmlns:p="http://schemas.openxmlformats.org/presentationml/2006/main">
+  <p:cSld>
+    <p:spTree>
+      <p:nvGrpSpPr>
+        <p:cNvPr id="1" name=""/>
+        <p:cNvGrpSpPr/>
+        <p:nvPr/>
+      </p:nvGrpSpPr>
+      <p:grpSpPr>
+        <a:xfrm>
+          <a:off x="0" y="0"/>
+          <a:ext cx="0" cy="0"/>
+          <a:chOff x="0" y="0"/>
+          <a:chExt cx="0" cy="0"/>
+        </a:xfrm>
+      </p:grpSpPr>
+      <p:sp>
+        <p:nvSpPr>
+          <p:cNvPr id="2" name="Folienbildplatzhalter 1"/>
+          <p:cNvSpPr>
+            <a:spLocks noGrp="1" noRot="1" noChangeAspect="1"/>
+          </p:cNvSpPr>
+          <p:nvPr>
+            <p:ph type="sldImg"/>
+          </p:nvPr>
+        </p:nvSpPr>
+        <p:spPr/>
+      </p:sp>
+      <p:sp>
+        <p:nvSpPr>
+          <p:cNvPr id="3" name="Notizenplatzhalter 2"/>
+          <p:cNvSpPr>
+            <a:spLocks noGrp="1"/>
+          </p:cNvSpPr>
+          <p:nvPr>
+            <p:ph type="body" idx="1"/>
+          </p:nvPr>
+        </p:nvSpPr>
+        <p:spPr/>
+        <p:txBody>
+          <a:bodyPr/>
+          <a:lstStyle/>
+          <a:p>
+            <a:r>
+              <a:rPr lang="de-DE" dirty="0"/>
+              <a:t>Die wichtigste Anforderung ist Benutzerfreundlichkeit</a:t>
+            </a:r>
+          </a:p>
+          <a:p>
+            <a:r>
+              <a:rPr lang="de-DE" dirty="0"/>
+              <a:t>Die Anwendung kann komplett über die GUI konfiguriert werden</a:t>
+            </a:r>
+          </a:p>
+          <a:p>
+            <a:r>
+              <a:rPr lang="de-DE" dirty="0"/>
+              <a:t>Man kann……</a:t>
+            </a:r>
+          </a:p>
+          <a:p>
+            <a:r>
+              <a:rPr lang="de-DE" dirty="0"/>
+              <a:t>……. neue </a:t>
+            </a:r>
+            <a:r>
+              <a:rPr lang="de-DE" dirty="0" err="1"/>
+              <a:t>Worker</a:t>
+            </a:r>
+            <a:r>
+              <a:rPr lang="de-DE" dirty="0"/>
+              <a:t> hinzufügen</a:t>
+            </a:r>
+          </a:p>
+          <a:p>
+            <a:r>
+              <a:rPr lang="de-DE" dirty="0"/>
+              <a:t>…….. Die Parameter setzten</a:t>
+            </a:r>
+          </a:p>
+          <a:p>
+            <a:r>
+              <a:rPr lang="de-DE" dirty="0"/>
+              <a:t>……. Bestehende </a:t>
+            </a:r>
+            <a:r>
+              <a:rPr lang="de-DE" dirty="0" err="1"/>
+              <a:t>Worker</a:t>
+            </a:r>
+            <a:r>
+              <a:rPr lang="de-DE" dirty="0"/>
+              <a:t> editieren </a:t>
+            </a:r>
+          </a:p>
+          <a:p>
+            <a:r>
+              <a:rPr lang="de-DE" dirty="0"/>
+              <a:t>……..oder löschen</a:t>
+            </a:r>
+          </a:p>
+        </p:txBody>
+      </p:sp>
+      <p:sp>
+        <p:nvSpPr>
+          <p:cNvPr id="4" name="Foliennummernplatzhalter 3"/>
+          <p:cNvSpPr>
+            <a:spLocks noGrp="1"/>
+          </p:cNvSpPr>
+          <p:nvPr>
+            <p:ph type="sldNum" sz="quarter" idx="5"/>
+          </p:nvPr>
+        </p:nvSpPr>
+        <p:spPr/>
+        <p:txBody>
+          <a:bodyPr/>
+          <a:lstStyle/>
+          <a:p>
+            <a:fld id="{742BFD6F-DD94-4948-BBA6-AD5AE625A179}" type="slidenum">
+              <a:rPr lang="de-DE" smtClean="0"/>
+              <a:t>2</a:t>
+            </a:fld>
+            <a:endParaRPr lang="de-DE"/>
+          </a:p>
+        </p:txBody>
+      </p:sp>
+    </p:spTree>
+    <p:extLst>
+      <p:ext uri="{BB962C8B-B14F-4D97-AF65-F5344CB8AC3E}">
+        <p14:creationId xmlns:p14="http://schemas.microsoft.com/office/powerpoint/2010/main" val="1775660955"/>
+      </p:ext>
+    </p:extLst>
+  </p:cSld>
+  <p:clrMapOvr>
+    <a:masterClrMapping/>
+  </p:clrMapOvr>
+</p:notes>
+</file>
+
+<file path=ppt/notesSlides/notesSlide3.xml><?xml version="1.0" encoding="utf-8"?>
+<p:notes xmlns:a="http://schemas.openxmlformats.org/drawingml/2006/main" xmlns:r="http://schemas.openxmlformats.org/officeDocument/2006/relationships" xmlns:p="http://schemas.openxmlformats.org/presentationml/2006/main">
+  <p:cSld>
+    <p:spTree>
+      <p:nvGrpSpPr>
+        <p:cNvPr id="1" name=""/>
+        <p:cNvGrpSpPr/>
+        <p:nvPr/>
+      </p:nvGrpSpPr>
+      <p:grpSpPr>
+        <a:xfrm>
+          <a:off x="0" y="0"/>
+          <a:ext cx="0" cy="0"/>
+          <a:chOff x="0" y="0"/>
+          <a:chExt cx="0" cy="0"/>
+        </a:xfrm>
+      </p:grpSpPr>
+      <p:sp>
+        <p:nvSpPr>
+          <p:cNvPr id="2" name="Folienbildplatzhalter 1"/>
+          <p:cNvSpPr>
+            <a:spLocks noGrp="1" noRot="1" noChangeAspect="1"/>
+          </p:cNvSpPr>
+          <p:nvPr>
+            <p:ph type="sldImg"/>
+          </p:nvPr>
+        </p:nvSpPr>
+        <p:spPr/>
+      </p:sp>
+      <p:sp>
+        <p:nvSpPr>
+          <p:cNvPr id="3" name="Notizenplatzhalter 2"/>
+          <p:cNvSpPr>
+            <a:spLocks noGrp="1"/>
+          </p:cNvSpPr>
+          <p:nvPr>
+            <p:ph type="body" idx="1"/>
+          </p:nvPr>
+        </p:nvSpPr>
+        <p:spPr/>
+        <p:txBody>
+          <a:bodyPr/>
+          <a:lstStyle/>
+          <a:p>
+            <a:r>
               <a:rPr lang="de-DE" dirty="0" err="1"/>
               <a:t>manager</a:t>
             </a:r>
@@ -614,7 +898,7 @@
 </p:notes>
 </file>
 
-<file path=ppt/notesSlides/notesSlide2.xml><?xml version="1.0" encoding="utf-8"?>
+<file path=ppt/notesSlides/notesSlide4.xml><?xml version="1.0" encoding="utf-8"?>
 <p:notes xmlns:a="http://schemas.openxmlformats.org/drawingml/2006/main" xmlns:r="http://schemas.openxmlformats.org/officeDocument/2006/relationships" xmlns:p="http://schemas.openxmlformats.org/presentationml/2006/main">
   <p:cSld>
     <p:spTree>
@@ -905,7 +1189,7 @@
           <a:p>
             <a:fld id="{78696EF2-BB83-470F-9DFF-51133980F409}" type="datetimeFigureOut">
               <a:rPr lang="de-DE" smtClean="0"/>
-              <a:t>18.06.2019</a:t>
+              <a:t>19.06.2019</a:t>
             </a:fld>
             <a:endParaRPr lang="de-DE"/>
           </a:p>
@@ -1103,7 +1387,7 @@
           <a:p>
             <a:fld id="{78696EF2-BB83-470F-9DFF-51133980F409}" type="datetimeFigureOut">
               <a:rPr lang="de-DE" smtClean="0"/>
-              <a:t>18.06.2019</a:t>
+              <a:t>19.06.2019</a:t>
             </a:fld>
             <a:endParaRPr lang="de-DE"/>
           </a:p>
@@ -1311,7 +1595,7 @@
           <a:p>
             <a:fld id="{78696EF2-BB83-470F-9DFF-51133980F409}" type="datetimeFigureOut">
               <a:rPr lang="de-DE" smtClean="0"/>
-              <a:t>18.06.2019</a:t>
+              <a:t>19.06.2019</a:t>
             </a:fld>
             <a:endParaRPr lang="de-DE"/>
           </a:p>
@@ -1509,7 +1793,7 @@
           <a:p>
             <a:fld id="{78696EF2-BB83-470F-9DFF-51133980F409}" type="datetimeFigureOut">
               <a:rPr lang="de-DE" smtClean="0"/>
-              <a:t>18.06.2019</a:t>
+              <a:t>19.06.2019</a:t>
             </a:fld>
             <a:endParaRPr lang="de-DE"/>
           </a:p>
@@ -1784,7 +2068,7 @@
           <a:p>
             <a:fld id="{78696EF2-BB83-470F-9DFF-51133980F409}" type="datetimeFigureOut">
               <a:rPr lang="de-DE" smtClean="0"/>
-              <a:t>18.06.2019</a:t>
+              <a:t>19.06.2019</a:t>
             </a:fld>
             <a:endParaRPr lang="de-DE"/>
           </a:p>
@@ -2049,7 +2333,7 @@
           <a:p>
             <a:fld id="{78696EF2-BB83-470F-9DFF-51133980F409}" type="datetimeFigureOut">
               <a:rPr lang="de-DE" smtClean="0"/>
-              <a:t>18.06.2019</a:t>
+              <a:t>19.06.2019</a:t>
             </a:fld>
             <a:endParaRPr lang="de-DE"/>
           </a:p>
@@ -2461,7 +2745,7 @@
           <a:p>
             <a:fld id="{78696EF2-BB83-470F-9DFF-51133980F409}" type="datetimeFigureOut">
               <a:rPr lang="de-DE" smtClean="0"/>
-              <a:t>18.06.2019</a:t>
+              <a:t>19.06.2019</a:t>
             </a:fld>
             <a:endParaRPr lang="de-DE"/>
           </a:p>
@@ -2602,7 +2886,7 @@
           <a:p>
             <a:fld id="{78696EF2-BB83-470F-9DFF-51133980F409}" type="datetimeFigureOut">
               <a:rPr lang="de-DE" smtClean="0"/>
-              <a:t>18.06.2019</a:t>
+              <a:t>19.06.2019</a:t>
             </a:fld>
             <a:endParaRPr lang="de-DE"/>
           </a:p>
@@ -2715,7 +2999,7 @@
           <a:p>
             <a:fld id="{78696EF2-BB83-470F-9DFF-51133980F409}" type="datetimeFigureOut">
               <a:rPr lang="de-DE" smtClean="0"/>
-              <a:t>18.06.2019</a:t>
+              <a:t>19.06.2019</a:t>
             </a:fld>
             <a:endParaRPr lang="de-DE"/>
           </a:p>
@@ -3026,7 +3310,7 @@
           <a:p>
             <a:fld id="{78696EF2-BB83-470F-9DFF-51133980F409}" type="datetimeFigureOut">
               <a:rPr lang="de-DE" smtClean="0"/>
-              <a:t>18.06.2019</a:t>
+              <a:t>19.06.2019</a:t>
             </a:fld>
             <a:endParaRPr lang="de-DE"/>
           </a:p>
@@ -3314,7 +3598,7 @@
           <a:p>
             <a:fld id="{78696EF2-BB83-470F-9DFF-51133980F409}" type="datetimeFigureOut">
               <a:rPr lang="de-DE" smtClean="0"/>
-              <a:t>18.06.2019</a:t>
+              <a:t>19.06.2019</a:t>
             </a:fld>
             <a:endParaRPr lang="de-DE"/>
           </a:p>
@@ -3555,7 +3839,7 @@
           <a:p>
             <a:fld id="{78696EF2-BB83-470F-9DFF-51133980F409}" type="datetimeFigureOut">
               <a:rPr lang="de-DE" smtClean="0"/>
-              <a:t>18.06.2019</a:t>
+              <a:t>19.06.2019</a:t>
             </a:fld>
             <a:endParaRPr lang="de-DE"/>
           </a:p>
@@ -4025,19 +4309,7 @@
           <a:p>
             <a:r>
               <a:rPr lang="de-DE" dirty="0"/>
-              <a:t>Wiederkehrende Aufgaben automatisieren</a:t>
-            </a:r>
-          </a:p>
-          <a:p>
-            <a:r>
-              <a:rPr lang="de-DE" dirty="0"/>
-              <a:t>Framework</a:t>
-            </a:r>
-          </a:p>
-          <a:p>
-            <a:r>
-              <a:rPr lang="de-DE" dirty="0"/>
-              <a:t>Eigene Implementierung durch die Klasse „</a:t>
+              <a:t>Wiederkehrende Aufgaben automatisieren durch „</a:t>
             </a:r>
             <a:r>
               <a:rPr lang="de-DE" dirty="0" err="1"/>
@@ -4046,6 +4318,37 @@
             <a:r>
               <a:rPr lang="de-DE" dirty="0"/>
               <a:t>“</a:t>
+            </a:r>
+          </a:p>
+          <a:p>
+            <a:r>
+              <a:rPr lang="de-DE" dirty="0"/>
+              <a:t>Framework: Organisiert nur die </a:t>
+            </a:r>
+            <a:r>
+              <a:rPr lang="de-DE" dirty="0" err="1"/>
+              <a:t>Worker</a:t>
+            </a:r>
+            <a:endParaRPr lang="de-DE" dirty="0"/>
+          </a:p>
+          <a:p>
+            <a:r>
+              <a:rPr lang="de-DE" dirty="0"/>
+              <a:t>Eigene Implementierung durch ableiten der Klasse „</a:t>
+            </a:r>
+            <a:r>
+              <a:rPr lang="de-DE" dirty="0" err="1"/>
+              <a:t>Worker</a:t>
+            </a:r>
+            <a:r>
+              <a:rPr lang="de-DE" dirty="0"/>
+              <a:t>“</a:t>
+            </a:r>
+          </a:p>
+          <a:p>
+            <a:r>
+              <a:rPr lang="de-DE" dirty="0"/>
+              <a:t>Quelloffen</a:t>
             </a:r>
           </a:p>
           <a:p>
@@ -4074,6 +4377,387 @@
   <p:clrMapOvr>
     <a:masterClrMapping/>
   </p:clrMapOvr>
+  <p:timing>
+    <p:tnLst>
+      <p:par>
+        <p:cTn id="1" dur="indefinite" restart="never" nodeType="tmRoot">
+          <p:childTnLst>
+            <p:seq concurrent="1" nextAc="seek">
+              <p:cTn id="2" dur="indefinite" nodeType="mainSeq">
+                <p:childTnLst>
+                  <p:par>
+                    <p:cTn id="3" fill="hold">
+                      <p:stCondLst>
+                        <p:cond delay="indefinite"/>
+                      </p:stCondLst>
+                      <p:childTnLst>
+                        <p:par>
+                          <p:cTn id="4" fill="hold">
+                            <p:stCondLst>
+                              <p:cond delay="0"/>
+                            </p:stCondLst>
+                            <p:childTnLst>
+                              <p:par>
+                                <p:cTn id="5" presetID="10" presetClass="entr" presetSubtype="0" fill="hold" grpId="0" nodeType="clickEffect">
+                                  <p:stCondLst>
+                                    <p:cond delay="0"/>
+                                  </p:stCondLst>
+                                  <p:childTnLst>
+                                    <p:set>
+                                      <p:cBhvr>
+                                        <p:cTn id="6" dur="1" fill="hold">
+                                          <p:stCondLst>
+                                            <p:cond delay="0"/>
+                                          </p:stCondLst>
+                                        </p:cTn>
+                                        <p:tgtEl>
+                                          <p:spTgt spid="3">
+                                            <p:txEl>
+                                              <p:pRg st="0" end="0"/>
+                                            </p:txEl>
+                                          </p:spTgt>
+                                        </p:tgtEl>
+                                        <p:attrNameLst>
+                                          <p:attrName>style.visibility</p:attrName>
+                                        </p:attrNameLst>
+                                      </p:cBhvr>
+                                      <p:to>
+                                        <p:strVal val="visible"/>
+                                      </p:to>
+                                    </p:set>
+                                    <p:animEffect transition="in" filter="fade">
+                                      <p:cBhvr>
+                                        <p:cTn id="7" dur="500"/>
+                                        <p:tgtEl>
+                                          <p:spTgt spid="3">
+                                            <p:txEl>
+                                              <p:pRg st="0" end="0"/>
+                                            </p:txEl>
+                                          </p:spTgt>
+                                        </p:tgtEl>
+                                      </p:cBhvr>
+                                    </p:animEffect>
+                                  </p:childTnLst>
+                                </p:cTn>
+                              </p:par>
+                            </p:childTnLst>
+                          </p:cTn>
+                        </p:par>
+                      </p:childTnLst>
+                    </p:cTn>
+                  </p:par>
+                  <p:par>
+                    <p:cTn id="8" fill="hold">
+                      <p:stCondLst>
+                        <p:cond delay="indefinite"/>
+                      </p:stCondLst>
+                      <p:childTnLst>
+                        <p:par>
+                          <p:cTn id="9" fill="hold">
+                            <p:stCondLst>
+                              <p:cond delay="0"/>
+                            </p:stCondLst>
+                            <p:childTnLst>
+                              <p:par>
+                                <p:cTn id="10" presetID="10" presetClass="entr" presetSubtype="0" fill="hold" grpId="0" nodeType="clickEffect">
+                                  <p:stCondLst>
+                                    <p:cond delay="0"/>
+                                  </p:stCondLst>
+                                  <p:childTnLst>
+                                    <p:set>
+                                      <p:cBhvr>
+                                        <p:cTn id="11" dur="1" fill="hold">
+                                          <p:stCondLst>
+                                            <p:cond delay="0"/>
+                                          </p:stCondLst>
+                                        </p:cTn>
+                                        <p:tgtEl>
+                                          <p:spTgt spid="3">
+                                            <p:txEl>
+                                              <p:pRg st="1" end="1"/>
+                                            </p:txEl>
+                                          </p:spTgt>
+                                        </p:tgtEl>
+                                        <p:attrNameLst>
+                                          <p:attrName>style.visibility</p:attrName>
+                                        </p:attrNameLst>
+                                      </p:cBhvr>
+                                      <p:to>
+                                        <p:strVal val="visible"/>
+                                      </p:to>
+                                    </p:set>
+                                    <p:animEffect transition="in" filter="fade">
+                                      <p:cBhvr>
+                                        <p:cTn id="12" dur="500"/>
+                                        <p:tgtEl>
+                                          <p:spTgt spid="3">
+                                            <p:txEl>
+                                              <p:pRg st="1" end="1"/>
+                                            </p:txEl>
+                                          </p:spTgt>
+                                        </p:tgtEl>
+                                      </p:cBhvr>
+                                    </p:animEffect>
+                                  </p:childTnLst>
+                                </p:cTn>
+                              </p:par>
+                            </p:childTnLst>
+                          </p:cTn>
+                        </p:par>
+                      </p:childTnLst>
+                    </p:cTn>
+                  </p:par>
+                  <p:par>
+                    <p:cTn id="13" fill="hold">
+                      <p:stCondLst>
+                        <p:cond delay="indefinite"/>
+                      </p:stCondLst>
+                      <p:childTnLst>
+                        <p:par>
+                          <p:cTn id="14" fill="hold">
+                            <p:stCondLst>
+                              <p:cond delay="0"/>
+                            </p:stCondLst>
+                            <p:childTnLst>
+                              <p:par>
+                                <p:cTn id="15" presetID="10" presetClass="entr" presetSubtype="0" fill="hold" grpId="0" nodeType="clickEffect">
+                                  <p:stCondLst>
+                                    <p:cond delay="0"/>
+                                  </p:stCondLst>
+                                  <p:childTnLst>
+                                    <p:set>
+                                      <p:cBhvr>
+                                        <p:cTn id="16" dur="1" fill="hold">
+                                          <p:stCondLst>
+                                            <p:cond delay="0"/>
+                                          </p:stCondLst>
+                                        </p:cTn>
+                                        <p:tgtEl>
+                                          <p:spTgt spid="3">
+                                            <p:txEl>
+                                              <p:pRg st="2" end="2"/>
+                                            </p:txEl>
+                                          </p:spTgt>
+                                        </p:tgtEl>
+                                        <p:attrNameLst>
+                                          <p:attrName>style.visibility</p:attrName>
+                                        </p:attrNameLst>
+                                      </p:cBhvr>
+                                      <p:to>
+                                        <p:strVal val="visible"/>
+                                      </p:to>
+                                    </p:set>
+                                    <p:animEffect transition="in" filter="fade">
+                                      <p:cBhvr>
+                                        <p:cTn id="17" dur="500"/>
+                                        <p:tgtEl>
+                                          <p:spTgt spid="3">
+                                            <p:txEl>
+                                              <p:pRg st="2" end="2"/>
+                                            </p:txEl>
+                                          </p:spTgt>
+                                        </p:tgtEl>
+                                      </p:cBhvr>
+                                    </p:animEffect>
+                                  </p:childTnLst>
+                                </p:cTn>
+                              </p:par>
+                            </p:childTnLst>
+                          </p:cTn>
+                        </p:par>
+                      </p:childTnLst>
+                    </p:cTn>
+                  </p:par>
+                  <p:par>
+                    <p:cTn id="18" fill="hold">
+                      <p:stCondLst>
+                        <p:cond delay="indefinite"/>
+                      </p:stCondLst>
+                      <p:childTnLst>
+                        <p:par>
+                          <p:cTn id="19" fill="hold">
+                            <p:stCondLst>
+                              <p:cond delay="0"/>
+                            </p:stCondLst>
+                            <p:childTnLst>
+                              <p:par>
+                                <p:cTn id="20" presetID="10" presetClass="entr" presetSubtype="0" fill="hold" grpId="0" nodeType="clickEffect">
+                                  <p:stCondLst>
+                                    <p:cond delay="0"/>
+                                  </p:stCondLst>
+                                  <p:childTnLst>
+                                    <p:set>
+                                      <p:cBhvr>
+                                        <p:cTn id="21" dur="1" fill="hold">
+                                          <p:stCondLst>
+                                            <p:cond delay="0"/>
+                                          </p:stCondLst>
+                                        </p:cTn>
+                                        <p:tgtEl>
+                                          <p:spTgt spid="3">
+                                            <p:txEl>
+                                              <p:pRg st="3" end="3"/>
+                                            </p:txEl>
+                                          </p:spTgt>
+                                        </p:tgtEl>
+                                        <p:attrNameLst>
+                                          <p:attrName>style.visibility</p:attrName>
+                                        </p:attrNameLst>
+                                      </p:cBhvr>
+                                      <p:to>
+                                        <p:strVal val="visible"/>
+                                      </p:to>
+                                    </p:set>
+                                    <p:animEffect transition="in" filter="fade">
+                                      <p:cBhvr>
+                                        <p:cTn id="22" dur="500"/>
+                                        <p:tgtEl>
+                                          <p:spTgt spid="3">
+                                            <p:txEl>
+                                              <p:pRg st="3" end="3"/>
+                                            </p:txEl>
+                                          </p:spTgt>
+                                        </p:tgtEl>
+                                      </p:cBhvr>
+                                    </p:animEffect>
+                                  </p:childTnLst>
+                                </p:cTn>
+                              </p:par>
+                            </p:childTnLst>
+                          </p:cTn>
+                        </p:par>
+                      </p:childTnLst>
+                    </p:cTn>
+                  </p:par>
+                  <p:par>
+                    <p:cTn id="23" fill="hold">
+                      <p:stCondLst>
+                        <p:cond delay="indefinite"/>
+                      </p:stCondLst>
+                      <p:childTnLst>
+                        <p:par>
+                          <p:cTn id="24" fill="hold">
+                            <p:stCondLst>
+                              <p:cond delay="0"/>
+                            </p:stCondLst>
+                            <p:childTnLst>
+                              <p:par>
+                                <p:cTn id="25" presetID="10" presetClass="entr" presetSubtype="0" fill="hold" grpId="0" nodeType="clickEffect">
+                                  <p:stCondLst>
+                                    <p:cond delay="0"/>
+                                  </p:stCondLst>
+                                  <p:childTnLst>
+                                    <p:set>
+                                      <p:cBhvr>
+                                        <p:cTn id="26" dur="1" fill="hold">
+                                          <p:stCondLst>
+                                            <p:cond delay="0"/>
+                                          </p:stCondLst>
+                                        </p:cTn>
+                                        <p:tgtEl>
+                                          <p:spTgt spid="3">
+                                            <p:txEl>
+                                              <p:pRg st="4" end="4"/>
+                                            </p:txEl>
+                                          </p:spTgt>
+                                        </p:tgtEl>
+                                        <p:attrNameLst>
+                                          <p:attrName>style.visibility</p:attrName>
+                                        </p:attrNameLst>
+                                      </p:cBhvr>
+                                      <p:to>
+                                        <p:strVal val="visible"/>
+                                      </p:to>
+                                    </p:set>
+                                    <p:animEffect transition="in" filter="fade">
+                                      <p:cBhvr>
+                                        <p:cTn id="27" dur="500"/>
+                                        <p:tgtEl>
+                                          <p:spTgt spid="3">
+                                            <p:txEl>
+                                              <p:pRg st="4" end="4"/>
+                                            </p:txEl>
+                                          </p:spTgt>
+                                        </p:tgtEl>
+                                      </p:cBhvr>
+                                    </p:animEffect>
+                                  </p:childTnLst>
+                                </p:cTn>
+                              </p:par>
+                              <p:par>
+                                <p:cTn id="28" presetID="10" presetClass="entr" presetSubtype="0" fill="hold" grpId="0" nodeType="withEffect">
+                                  <p:stCondLst>
+                                    <p:cond delay="0"/>
+                                  </p:stCondLst>
+                                  <p:childTnLst>
+                                    <p:set>
+                                      <p:cBhvr>
+                                        <p:cTn id="29" dur="1" fill="hold">
+                                          <p:stCondLst>
+                                            <p:cond delay="0"/>
+                                          </p:stCondLst>
+                                        </p:cTn>
+                                        <p:tgtEl>
+                                          <p:spTgt spid="3">
+                                            <p:txEl>
+                                              <p:pRg st="5" end="5"/>
+                                            </p:txEl>
+                                          </p:spTgt>
+                                        </p:tgtEl>
+                                        <p:attrNameLst>
+                                          <p:attrName>style.visibility</p:attrName>
+                                        </p:attrNameLst>
+                                      </p:cBhvr>
+                                      <p:to>
+                                        <p:strVal val="visible"/>
+                                      </p:to>
+                                    </p:set>
+                                    <p:animEffect transition="in" filter="fade">
+                                      <p:cBhvr>
+                                        <p:cTn id="30" dur="500"/>
+                                        <p:tgtEl>
+                                          <p:spTgt spid="3">
+                                            <p:txEl>
+                                              <p:pRg st="5" end="5"/>
+                                            </p:txEl>
+                                          </p:spTgt>
+                                        </p:tgtEl>
+                                      </p:cBhvr>
+                                    </p:animEffect>
+                                  </p:childTnLst>
+                                </p:cTn>
+                              </p:par>
+                            </p:childTnLst>
+                          </p:cTn>
+                        </p:par>
+                      </p:childTnLst>
+                    </p:cTn>
+                  </p:par>
+                </p:childTnLst>
+              </p:cTn>
+              <p:prevCondLst>
+                <p:cond evt="onPrev" delay="0">
+                  <p:tgtEl>
+                    <p:sldTgt/>
+                  </p:tgtEl>
+                </p:cond>
+              </p:prevCondLst>
+              <p:nextCondLst>
+                <p:cond evt="onNext" delay="0">
+                  <p:tgtEl>
+                    <p:sldTgt/>
+                  </p:tgtEl>
+                </p:cond>
+              </p:nextCondLst>
+            </p:seq>
+          </p:childTnLst>
+        </p:cTn>
+      </p:par>
+    </p:tnLst>
+    <p:bldLst>
+      <p:bldP spid="3" grpId="0" build="p"/>
+    </p:bldLst>
+  </p:timing>
 </p:sld>
 </file>
 
@@ -4115,7 +4799,10 @@
           <a:bodyPr/>
           <a:lstStyle/>
           <a:p>
-            <a:endParaRPr lang="de-DE"/>
+            <a:r>
+              <a:rPr lang="de-DE" dirty="0"/>
+              <a:t>Wichtigste Anforderung</a:t>
+            </a:r>
           </a:p>
         </p:txBody>
       </p:sp>
@@ -4137,12 +4824,89 @@
         </p:nvSpPr>
         <p:spPr/>
         <p:txBody>
-          <a:bodyPr/>
-          <a:lstStyle/>
+          <a:bodyPr>
+            <a:normAutofit/>
+          </a:bodyPr>
+          <a:lstStyle/>
+          <a:p>
+            <a:r>
+              <a:rPr lang="de-DE" sz="3600" dirty="0" err="1">
+                <a:solidFill>
+                  <a:srgbClr val="FF0000"/>
+                </a:solidFill>
+              </a:rPr>
+              <a:t>Benuterfreundlichkeit</a:t>
+            </a:r>
+            <a:endParaRPr lang="de-DE" sz="3600" dirty="0">
+              <a:solidFill>
+                <a:srgbClr val="FF0000"/>
+              </a:solidFill>
+            </a:endParaRPr>
+          </a:p>
           <a:p>
             <a:r>
               <a:rPr lang="de-DE" dirty="0"/>
-              <a:t>2. Erläutern Sie die wichtigste Anforderung</a:t>
+              <a:t>Konfiguration komplett über GUI</a:t>
+            </a:r>
+          </a:p>
+          <a:p>
+            <a:pPr lvl="1"/>
+            <a:r>
+              <a:rPr lang="de-DE" dirty="0"/>
+              <a:t>Neue </a:t>
+            </a:r>
+            <a:r>
+              <a:rPr lang="de-DE" dirty="0" err="1"/>
+              <a:t>Worker</a:t>
+            </a:r>
+            <a:r>
+              <a:rPr lang="de-DE" dirty="0"/>
+              <a:t> hinzufügen</a:t>
+            </a:r>
+          </a:p>
+          <a:p>
+            <a:pPr lvl="1"/>
+            <a:r>
+              <a:rPr lang="de-DE" dirty="0"/>
+              <a:t>Parameter für </a:t>
+            </a:r>
+            <a:r>
+              <a:rPr lang="de-DE" dirty="0" err="1"/>
+              <a:t>Worker</a:t>
+            </a:r>
+            <a:r>
+              <a:rPr lang="de-DE" dirty="0"/>
+              <a:t> setzen</a:t>
+            </a:r>
+          </a:p>
+          <a:p>
+            <a:pPr lvl="1"/>
+            <a:r>
+              <a:rPr lang="de-DE" dirty="0"/>
+              <a:t>Bestehende </a:t>
+            </a:r>
+            <a:r>
+              <a:rPr lang="de-DE" dirty="0" err="1"/>
+              <a:t>Worker</a:t>
+            </a:r>
+            <a:r>
+              <a:rPr lang="de-DE" dirty="0"/>
+              <a:t> editieren</a:t>
+            </a:r>
+          </a:p>
+          <a:p>
+            <a:pPr lvl="1"/>
+            <a:r>
+              <a:rPr lang="de-DE" dirty="0"/>
+              <a:t>Bestehende </a:t>
+            </a:r>
+            <a:r>
+              <a:rPr lang="de-DE" dirty="0" err="1"/>
+              <a:t>Worker</a:t>
+            </a:r>
+            <a:r>
+              <a:rPr lang="de-DE" dirty="0"/>
+              <a:t> entfernen</a:t>
             </a:r>
           </a:p>
         </p:txBody>
@@ -4157,6 +4921,402 @@
   <p:clrMapOvr>
     <a:masterClrMapping/>
   </p:clrMapOvr>
+  <p:timing>
+    <p:tnLst>
+      <p:par>
+        <p:cTn id="1" dur="indefinite" restart="never" nodeType="tmRoot">
+          <p:childTnLst>
+            <p:seq concurrent="1" nextAc="seek">
+              <p:cTn id="2" dur="indefinite" nodeType="mainSeq">
+                <p:childTnLst>
+                  <p:par>
+                    <p:cTn id="3" fill="hold">
+                      <p:stCondLst>
+                        <p:cond delay="indefinite"/>
+                      </p:stCondLst>
+                      <p:childTnLst>
+                        <p:par>
+                          <p:cTn id="4" fill="hold">
+                            <p:stCondLst>
+                              <p:cond delay="0"/>
+                            </p:stCondLst>
+                            <p:childTnLst>
+                              <p:par>
+                                <p:cTn id="5" presetID="10" presetClass="entr" presetSubtype="0" fill="hold" nodeType="clickEffect">
+                                  <p:stCondLst>
+                                    <p:cond delay="0"/>
+                                  </p:stCondLst>
+                                  <p:childTnLst>
+                                    <p:set>
+                                      <p:cBhvr>
+                                        <p:cTn id="6" dur="1" fill="hold">
+                                          <p:stCondLst>
+                                            <p:cond delay="0"/>
+                                          </p:stCondLst>
+                                        </p:cTn>
+                                        <p:tgtEl>
+                                          <p:spTgt spid="3">
+                                            <p:txEl>
+                                              <p:pRg st="0" end="0"/>
+                                            </p:txEl>
+                                          </p:spTgt>
+                                        </p:tgtEl>
+                                        <p:attrNameLst>
+                                          <p:attrName>style.visibility</p:attrName>
+                                        </p:attrNameLst>
+                                      </p:cBhvr>
+                                      <p:to>
+                                        <p:strVal val="visible"/>
+                                      </p:to>
+                                    </p:set>
+                                    <p:animEffect transition="in" filter="fade">
+                                      <p:cBhvr>
+                                        <p:cTn id="7" dur="500"/>
+                                        <p:tgtEl>
+                                          <p:spTgt spid="3">
+                                            <p:txEl>
+                                              <p:pRg st="0" end="0"/>
+                                            </p:txEl>
+                                          </p:spTgt>
+                                        </p:tgtEl>
+                                      </p:cBhvr>
+                                    </p:animEffect>
+                                  </p:childTnLst>
+                                </p:cTn>
+                              </p:par>
+                            </p:childTnLst>
+                          </p:cTn>
+                        </p:par>
+                      </p:childTnLst>
+                    </p:cTn>
+                  </p:par>
+                  <p:par>
+                    <p:cTn id="8" fill="hold">
+                      <p:stCondLst>
+                        <p:cond delay="indefinite"/>
+                      </p:stCondLst>
+                      <p:childTnLst>
+                        <p:par>
+                          <p:cTn id="9" fill="hold">
+                            <p:stCondLst>
+                              <p:cond delay="0"/>
+                            </p:stCondLst>
+                            <p:childTnLst>
+                              <p:par>
+                                <p:cTn id="10" presetID="10" presetClass="entr" presetSubtype="0" fill="hold" nodeType="clickEffect">
+                                  <p:stCondLst>
+                                    <p:cond delay="0"/>
+                                  </p:stCondLst>
+                                  <p:childTnLst>
+                                    <p:set>
+                                      <p:cBhvr>
+                                        <p:cTn id="11" dur="1" fill="hold">
+                                          <p:stCondLst>
+                                            <p:cond delay="0"/>
+                                          </p:stCondLst>
+                                        </p:cTn>
+                                        <p:tgtEl>
+                                          <p:spTgt spid="3">
+                                            <p:txEl>
+                                              <p:pRg st="1" end="1"/>
+                                            </p:txEl>
+                                          </p:spTgt>
+                                        </p:tgtEl>
+                                        <p:attrNameLst>
+                                          <p:attrName>style.visibility</p:attrName>
+                                        </p:attrNameLst>
+                                      </p:cBhvr>
+                                      <p:to>
+                                        <p:strVal val="visible"/>
+                                      </p:to>
+                                    </p:set>
+                                    <p:animEffect transition="in" filter="fade">
+                                      <p:cBhvr>
+                                        <p:cTn id="12" dur="500"/>
+                                        <p:tgtEl>
+                                          <p:spTgt spid="3">
+                                            <p:txEl>
+                                              <p:pRg st="1" end="1"/>
+                                            </p:txEl>
+                                          </p:spTgt>
+                                        </p:tgtEl>
+                                      </p:cBhvr>
+                                    </p:animEffect>
+                                  </p:childTnLst>
+                                </p:cTn>
+                              </p:par>
+                            </p:childTnLst>
+                          </p:cTn>
+                        </p:par>
+                      </p:childTnLst>
+                    </p:cTn>
+                  </p:par>
+                  <p:par>
+                    <p:cTn id="13" fill="hold">
+                      <p:stCondLst>
+                        <p:cond delay="indefinite"/>
+                      </p:stCondLst>
+                      <p:childTnLst>
+                        <p:par>
+                          <p:cTn id="14" fill="hold">
+                            <p:stCondLst>
+                              <p:cond delay="0"/>
+                            </p:stCondLst>
+                            <p:childTnLst>
+                              <p:par>
+                                <p:cTn id="15" presetID="10" presetClass="entr" presetSubtype="0" fill="hold" nodeType="clickEffect">
+                                  <p:stCondLst>
+                                    <p:cond delay="0"/>
+                                  </p:stCondLst>
+                                  <p:childTnLst>
+                                    <p:set>
+                                      <p:cBhvr>
+                                        <p:cTn id="16" dur="1" fill="hold">
+                                          <p:stCondLst>
+                                            <p:cond delay="0"/>
+                                          </p:stCondLst>
+                                        </p:cTn>
+                                        <p:tgtEl>
+                                          <p:spTgt spid="3">
+                                            <p:txEl>
+                                              <p:pRg st="2" end="2"/>
+                                            </p:txEl>
+                                          </p:spTgt>
+                                        </p:tgtEl>
+                                        <p:attrNameLst>
+                                          <p:attrName>style.visibility</p:attrName>
+                                        </p:attrNameLst>
+                                      </p:cBhvr>
+                                      <p:to>
+                                        <p:strVal val="visible"/>
+                                      </p:to>
+                                    </p:set>
+                                    <p:animEffect transition="in" filter="fade">
+                                      <p:cBhvr>
+                                        <p:cTn id="17" dur="500"/>
+                                        <p:tgtEl>
+                                          <p:spTgt spid="3">
+                                            <p:txEl>
+                                              <p:pRg st="2" end="2"/>
+                                            </p:txEl>
+                                          </p:spTgt>
+                                        </p:tgtEl>
+                                      </p:cBhvr>
+                                    </p:animEffect>
+                                  </p:childTnLst>
+                                </p:cTn>
+                              </p:par>
+                            </p:childTnLst>
+                          </p:cTn>
+                        </p:par>
+                      </p:childTnLst>
+                    </p:cTn>
+                  </p:par>
+                  <p:par>
+                    <p:cTn id="18" fill="hold">
+                      <p:stCondLst>
+                        <p:cond delay="indefinite"/>
+                      </p:stCondLst>
+                      <p:childTnLst>
+                        <p:par>
+                          <p:cTn id="19" fill="hold">
+                            <p:stCondLst>
+                              <p:cond delay="0"/>
+                            </p:stCondLst>
+                            <p:childTnLst>
+                              <p:par>
+                                <p:cTn id="20" presetID="10" presetClass="entr" presetSubtype="0" fill="hold" nodeType="clickEffect">
+                                  <p:stCondLst>
+                                    <p:cond delay="0"/>
+                                  </p:stCondLst>
+                                  <p:childTnLst>
+                                    <p:set>
+                                      <p:cBhvr>
+                                        <p:cTn id="21" dur="1" fill="hold">
+                                          <p:stCondLst>
+                                            <p:cond delay="0"/>
+                                          </p:stCondLst>
+                                        </p:cTn>
+                                        <p:tgtEl>
+                                          <p:spTgt spid="3">
+                                            <p:txEl>
+                                              <p:pRg st="3" end="3"/>
+                                            </p:txEl>
+                                          </p:spTgt>
+                                        </p:tgtEl>
+                                        <p:attrNameLst>
+                                          <p:attrName>style.visibility</p:attrName>
+                                        </p:attrNameLst>
+                                      </p:cBhvr>
+                                      <p:to>
+                                        <p:strVal val="visible"/>
+                                      </p:to>
+                                    </p:set>
+                                    <p:animEffect transition="in" filter="fade">
+                                      <p:cBhvr>
+                                        <p:cTn id="22" dur="500"/>
+                                        <p:tgtEl>
+                                          <p:spTgt spid="3">
+                                            <p:txEl>
+                                              <p:pRg st="3" end="3"/>
+                                            </p:txEl>
+                                          </p:spTgt>
+                                        </p:tgtEl>
+                                      </p:cBhvr>
+                                    </p:animEffect>
+                                  </p:childTnLst>
+                                </p:cTn>
+                              </p:par>
+                            </p:childTnLst>
+                          </p:cTn>
+                        </p:par>
+                      </p:childTnLst>
+                    </p:cTn>
+                  </p:par>
+                  <p:par>
+                    <p:cTn id="23" fill="hold">
+                      <p:stCondLst>
+                        <p:cond delay="indefinite"/>
+                      </p:stCondLst>
+                      <p:childTnLst>
+                        <p:par>
+                          <p:cTn id="24" fill="hold">
+                            <p:stCondLst>
+                              <p:cond delay="0"/>
+                            </p:stCondLst>
+                            <p:childTnLst>
+                              <p:par>
+                                <p:cTn id="25" presetID="10" presetClass="entr" presetSubtype="0" fill="hold" nodeType="clickEffect">
+                                  <p:stCondLst>
+                                    <p:cond delay="0"/>
+                                  </p:stCondLst>
+                                  <p:childTnLst>
+                                    <p:set>
+                                      <p:cBhvr>
+                                        <p:cTn id="26" dur="1" fill="hold">
+                                          <p:stCondLst>
+                                            <p:cond delay="0"/>
+                                          </p:stCondLst>
+                                        </p:cTn>
+                                        <p:tgtEl>
+                                          <p:spTgt spid="3">
+                                            <p:txEl>
+                                              <p:pRg st="4" end="4"/>
+                                            </p:txEl>
+                                          </p:spTgt>
+                                        </p:tgtEl>
+                                        <p:attrNameLst>
+                                          <p:attrName>style.visibility</p:attrName>
+                                        </p:attrNameLst>
+                                      </p:cBhvr>
+                                      <p:to>
+                                        <p:strVal val="visible"/>
+                                      </p:to>
+                                    </p:set>
+                                    <p:animEffect transition="in" filter="fade">
+                                      <p:cBhvr>
+                                        <p:cTn id="27" dur="500"/>
+                                        <p:tgtEl>
+                                          <p:spTgt spid="3">
+                                            <p:txEl>
+                                              <p:pRg st="4" end="4"/>
+                                            </p:txEl>
+                                          </p:spTgt>
+                                        </p:tgtEl>
+                                      </p:cBhvr>
+                                    </p:animEffect>
+                                  </p:childTnLst>
+                                </p:cTn>
+                              </p:par>
+                            </p:childTnLst>
+                          </p:cTn>
+                        </p:par>
+                      </p:childTnLst>
+                    </p:cTn>
+                  </p:par>
+                  <p:par>
+                    <p:cTn id="28" fill="hold">
+                      <p:stCondLst>
+                        <p:cond delay="indefinite"/>
+                      </p:stCondLst>
+                      <p:childTnLst>
+                        <p:par>
+                          <p:cTn id="29" fill="hold">
+                            <p:stCondLst>
+                              <p:cond delay="0"/>
+                            </p:stCondLst>
+                            <p:childTnLst>
+                              <p:par>
+                                <p:cTn id="30" presetID="10" presetClass="entr" presetSubtype="0" fill="hold" nodeType="clickEffect">
+                                  <p:stCondLst>
+                                    <p:cond delay="0"/>
+                                  </p:stCondLst>
+                                  <p:childTnLst>
+                                    <p:set>
+                                      <p:cBhvr>
+                                        <p:cTn id="31" dur="1" fill="hold">
+                                          <p:stCondLst>
+                                            <p:cond delay="0"/>
+                                          </p:stCondLst>
+                                        </p:cTn>
+                                        <p:tgtEl>
+                                          <p:spTgt spid="3">
+                                            <p:txEl>
+                                              <p:pRg st="5" end="5"/>
+                                            </p:txEl>
+                                          </p:spTgt>
+                                        </p:tgtEl>
+                                        <p:attrNameLst>
+                                          <p:attrName>style.visibility</p:attrName>
+                                        </p:attrNameLst>
+                                      </p:cBhvr>
+                                      <p:to>
+                                        <p:strVal val="visible"/>
+                                      </p:to>
+                                    </p:set>
+                                    <p:animEffect transition="in" filter="fade">
+                                      <p:cBhvr>
+                                        <p:cTn id="32" dur="500"/>
+                                        <p:tgtEl>
+                                          <p:spTgt spid="3">
+                                            <p:txEl>
+                                              <p:pRg st="5" end="5"/>
+                                            </p:txEl>
+                                          </p:spTgt>
+                                        </p:tgtEl>
+                                      </p:cBhvr>
+                                    </p:animEffect>
+                                  </p:childTnLst>
+                                </p:cTn>
+                              </p:par>
+                            </p:childTnLst>
+                          </p:cTn>
+                        </p:par>
+                      </p:childTnLst>
+                    </p:cTn>
+                  </p:par>
+                </p:childTnLst>
+              </p:cTn>
+              <p:prevCondLst>
+                <p:cond evt="onPrev" delay="0">
+                  <p:tgtEl>
+                    <p:sldTgt/>
+                  </p:tgtEl>
+                </p:cond>
+              </p:prevCondLst>
+              <p:nextCondLst>
+                <p:cond evt="onNext" delay="0">
+                  <p:tgtEl>
+                    <p:sldTgt/>
+                  </p:tgtEl>
+                </p:cond>
+              </p:nextCondLst>
+            </p:seq>
+          </p:childTnLst>
+        </p:cTn>
+      </p:par>
+    </p:tnLst>
+  </p:timing>
 </p:sld>
 </file>
 
@@ -4267,7 +5427,10 @@
           <a:bodyPr/>
           <a:lstStyle/>
           <a:p>
-            <a:endParaRPr lang="de-DE"/>
+            <a:r>
+              <a:rPr lang="de-DE" dirty="0"/>
+              <a:t>Demonstrationsvideo</a:t>
+            </a:r>
           </a:p>
         </p:txBody>
       </p:sp>
@@ -4292,10 +5455,10 @@
           <a:bodyPr/>
           <a:lstStyle/>
           <a:p>
-            <a:r>
-              <a:rPr lang="de-DE" dirty="0"/>
-              <a:t>VIDEO?!?!?!?!?!?!</a:t>
-            </a:r>
+            <a:pPr marL="0" indent="0">
+              <a:buNone/>
+            </a:pPr>
+            <a:endParaRPr lang="de-DE" dirty="0"/>
           </a:p>
         </p:txBody>
       </p:sp>
@@ -4350,7 +5513,10 @@
           <a:bodyPr/>
           <a:lstStyle/>
           <a:p>
-            <a:endParaRPr lang="de-DE"/>
+            <a:r>
+              <a:rPr lang="de-DE" dirty="0"/>
+              <a:t>Reflexion</a:t>
+            </a:r>
           </a:p>
         </p:txBody>
       </p:sp>
@@ -4512,6 +5678,469 @@
   <p:clrMapOvr>
     <a:masterClrMapping/>
   </p:clrMapOvr>
+  <p:timing>
+    <p:tnLst>
+      <p:par>
+        <p:cTn id="1" dur="indefinite" restart="never" nodeType="tmRoot">
+          <p:childTnLst>
+            <p:seq concurrent="1" nextAc="seek">
+              <p:cTn id="2" dur="indefinite" nodeType="mainSeq">
+                <p:childTnLst>
+                  <p:par>
+                    <p:cTn id="3" fill="hold">
+                      <p:stCondLst>
+                        <p:cond delay="indefinite"/>
+                      </p:stCondLst>
+                      <p:childTnLst>
+                        <p:par>
+                          <p:cTn id="4" fill="hold">
+                            <p:stCondLst>
+                              <p:cond delay="0"/>
+                            </p:stCondLst>
+                            <p:childTnLst>
+                              <p:par>
+                                <p:cTn id="5" presetID="10" presetClass="entr" presetSubtype="0" fill="hold" grpId="0" nodeType="clickEffect">
+                                  <p:stCondLst>
+                                    <p:cond delay="0"/>
+                                  </p:stCondLst>
+                                  <p:childTnLst>
+                                    <p:set>
+                                      <p:cBhvr>
+                                        <p:cTn id="6" dur="1" fill="hold">
+                                          <p:stCondLst>
+                                            <p:cond delay="0"/>
+                                          </p:stCondLst>
+                                        </p:cTn>
+                                        <p:tgtEl>
+                                          <p:spTgt spid="8">
+                                            <p:txEl>
+                                              <p:pRg st="0" end="0"/>
+                                            </p:txEl>
+                                          </p:spTgt>
+                                        </p:tgtEl>
+                                        <p:attrNameLst>
+                                          <p:attrName>style.visibility</p:attrName>
+                                        </p:attrNameLst>
+                                      </p:cBhvr>
+                                      <p:to>
+                                        <p:strVal val="visible"/>
+                                      </p:to>
+                                    </p:set>
+                                    <p:animEffect transition="in" filter="fade">
+                                      <p:cBhvr>
+                                        <p:cTn id="7" dur="500"/>
+                                        <p:tgtEl>
+                                          <p:spTgt spid="8">
+                                            <p:txEl>
+                                              <p:pRg st="0" end="0"/>
+                                            </p:txEl>
+                                          </p:spTgt>
+                                        </p:tgtEl>
+                                      </p:cBhvr>
+                                    </p:animEffect>
+                                  </p:childTnLst>
+                                </p:cTn>
+                              </p:par>
+                            </p:childTnLst>
+                          </p:cTn>
+                        </p:par>
+                      </p:childTnLst>
+                    </p:cTn>
+                  </p:par>
+                  <p:par>
+                    <p:cTn id="8" fill="hold">
+                      <p:stCondLst>
+                        <p:cond delay="indefinite"/>
+                      </p:stCondLst>
+                      <p:childTnLst>
+                        <p:par>
+                          <p:cTn id="9" fill="hold">
+                            <p:stCondLst>
+                              <p:cond delay="0"/>
+                            </p:stCondLst>
+                            <p:childTnLst>
+                              <p:par>
+                                <p:cTn id="10" presetID="10" presetClass="entr" presetSubtype="0" fill="hold" grpId="0" nodeType="clickEffect">
+                                  <p:stCondLst>
+                                    <p:cond delay="0"/>
+                                  </p:stCondLst>
+                                  <p:childTnLst>
+                                    <p:set>
+                                      <p:cBhvr>
+                                        <p:cTn id="11" dur="1" fill="hold">
+                                          <p:stCondLst>
+                                            <p:cond delay="0"/>
+                                          </p:stCondLst>
+                                        </p:cTn>
+                                        <p:tgtEl>
+                                          <p:spTgt spid="9">
+                                            <p:txEl>
+                                              <p:pRg st="0" end="0"/>
+                                            </p:txEl>
+                                          </p:spTgt>
+                                        </p:tgtEl>
+                                        <p:attrNameLst>
+                                          <p:attrName>style.visibility</p:attrName>
+                                        </p:attrNameLst>
+                                      </p:cBhvr>
+                                      <p:to>
+                                        <p:strVal val="visible"/>
+                                      </p:to>
+                                    </p:set>
+                                    <p:animEffect transition="in" filter="fade">
+                                      <p:cBhvr>
+                                        <p:cTn id="12" dur="500"/>
+                                        <p:tgtEl>
+                                          <p:spTgt spid="9">
+                                            <p:txEl>
+                                              <p:pRg st="0" end="0"/>
+                                            </p:txEl>
+                                          </p:spTgt>
+                                        </p:tgtEl>
+                                      </p:cBhvr>
+                                    </p:animEffect>
+                                  </p:childTnLst>
+                                </p:cTn>
+                              </p:par>
+                            </p:childTnLst>
+                          </p:cTn>
+                        </p:par>
+                      </p:childTnLst>
+                    </p:cTn>
+                  </p:par>
+                  <p:par>
+                    <p:cTn id="13" fill="hold">
+                      <p:stCondLst>
+                        <p:cond delay="indefinite"/>
+                      </p:stCondLst>
+                      <p:childTnLst>
+                        <p:par>
+                          <p:cTn id="14" fill="hold">
+                            <p:stCondLst>
+                              <p:cond delay="0"/>
+                            </p:stCondLst>
+                            <p:childTnLst>
+                              <p:par>
+                                <p:cTn id="15" presetID="10" presetClass="entr" presetSubtype="0" fill="hold" grpId="0" nodeType="clickEffect">
+                                  <p:stCondLst>
+                                    <p:cond delay="0"/>
+                                  </p:stCondLst>
+                                  <p:childTnLst>
+                                    <p:set>
+                                      <p:cBhvr>
+                                        <p:cTn id="16" dur="1" fill="hold">
+                                          <p:stCondLst>
+                                            <p:cond delay="0"/>
+                                          </p:stCondLst>
+                                        </p:cTn>
+                                        <p:tgtEl>
+                                          <p:spTgt spid="9">
+                                            <p:txEl>
+                                              <p:pRg st="1" end="1"/>
+                                            </p:txEl>
+                                          </p:spTgt>
+                                        </p:tgtEl>
+                                        <p:attrNameLst>
+                                          <p:attrName>style.visibility</p:attrName>
+                                        </p:attrNameLst>
+                                      </p:cBhvr>
+                                      <p:to>
+                                        <p:strVal val="visible"/>
+                                      </p:to>
+                                    </p:set>
+                                    <p:animEffect transition="in" filter="fade">
+                                      <p:cBhvr>
+                                        <p:cTn id="17" dur="500"/>
+                                        <p:tgtEl>
+                                          <p:spTgt spid="9">
+                                            <p:txEl>
+                                              <p:pRg st="1" end="1"/>
+                                            </p:txEl>
+                                          </p:spTgt>
+                                        </p:tgtEl>
+                                      </p:cBhvr>
+                                    </p:animEffect>
+                                  </p:childTnLst>
+                                </p:cTn>
+                              </p:par>
+                            </p:childTnLst>
+                          </p:cTn>
+                        </p:par>
+                      </p:childTnLst>
+                    </p:cTn>
+                  </p:par>
+                  <p:par>
+                    <p:cTn id="18" fill="hold">
+                      <p:stCondLst>
+                        <p:cond delay="indefinite"/>
+                      </p:stCondLst>
+                      <p:childTnLst>
+                        <p:par>
+                          <p:cTn id="19" fill="hold">
+                            <p:stCondLst>
+                              <p:cond delay="0"/>
+                            </p:stCondLst>
+                            <p:childTnLst>
+                              <p:par>
+                                <p:cTn id="20" presetID="10" presetClass="entr" presetSubtype="0" fill="hold" grpId="0" nodeType="clickEffect">
+                                  <p:stCondLst>
+                                    <p:cond delay="0"/>
+                                  </p:stCondLst>
+                                  <p:childTnLst>
+                                    <p:set>
+                                      <p:cBhvr>
+                                        <p:cTn id="21" dur="1" fill="hold">
+                                          <p:stCondLst>
+                                            <p:cond delay="0"/>
+                                          </p:stCondLst>
+                                        </p:cTn>
+                                        <p:tgtEl>
+                                          <p:spTgt spid="9">
+                                            <p:txEl>
+                                              <p:pRg st="2" end="2"/>
+                                            </p:txEl>
+                                          </p:spTgt>
+                                        </p:tgtEl>
+                                        <p:attrNameLst>
+                                          <p:attrName>style.visibility</p:attrName>
+                                        </p:attrNameLst>
+                                      </p:cBhvr>
+                                      <p:to>
+                                        <p:strVal val="visible"/>
+                                      </p:to>
+                                    </p:set>
+                                    <p:animEffect transition="in" filter="fade">
+                                      <p:cBhvr>
+                                        <p:cTn id="22" dur="500"/>
+                                        <p:tgtEl>
+                                          <p:spTgt spid="9">
+                                            <p:txEl>
+                                              <p:pRg st="2" end="2"/>
+                                            </p:txEl>
+                                          </p:spTgt>
+                                        </p:tgtEl>
+                                      </p:cBhvr>
+                                    </p:animEffect>
+                                  </p:childTnLst>
+                                </p:cTn>
+                              </p:par>
+                            </p:childTnLst>
+                          </p:cTn>
+                        </p:par>
+                      </p:childTnLst>
+                    </p:cTn>
+                  </p:par>
+                  <p:par>
+                    <p:cTn id="23" fill="hold">
+                      <p:stCondLst>
+                        <p:cond delay="indefinite"/>
+                      </p:stCondLst>
+                      <p:childTnLst>
+                        <p:par>
+                          <p:cTn id="24" fill="hold">
+                            <p:stCondLst>
+                              <p:cond delay="0"/>
+                            </p:stCondLst>
+                            <p:childTnLst>
+                              <p:par>
+                                <p:cTn id="25" presetID="10" presetClass="entr" presetSubtype="0" fill="hold" grpId="0" nodeType="clickEffect">
+                                  <p:stCondLst>
+                                    <p:cond delay="0"/>
+                                  </p:stCondLst>
+                                  <p:childTnLst>
+                                    <p:set>
+                                      <p:cBhvr>
+                                        <p:cTn id="26" dur="1" fill="hold">
+                                          <p:stCondLst>
+                                            <p:cond delay="0"/>
+                                          </p:stCondLst>
+                                        </p:cTn>
+                                        <p:tgtEl>
+                                          <p:spTgt spid="10">
+                                            <p:txEl>
+                                              <p:pRg st="0" end="0"/>
+                                            </p:txEl>
+                                          </p:spTgt>
+                                        </p:tgtEl>
+                                        <p:attrNameLst>
+                                          <p:attrName>style.visibility</p:attrName>
+                                        </p:attrNameLst>
+                                      </p:cBhvr>
+                                      <p:to>
+                                        <p:strVal val="visible"/>
+                                      </p:to>
+                                    </p:set>
+                                    <p:animEffect transition="in" filter="fade">
+                                      <p:cBhvr>
+                                        <p:cTn id="27" dur="500"/>
+                                        <p:tgtEl>
+                                          <p:spTgt spid="10">
+                                            <p:txEl>
+                                              <p:pRg st="0" end="0"/>
+                                            </p:txEl>
+                                          </p:spTgt>
+                                        </p:tgtEl>
+                                      </p:cBhvr>
+                                    </p:animEffect>
+                                  </p:childTnLst>
+                                </p:cTn>
+                              </p:par>
+                            </p:childTnLst>
+                          </p:cTn>
+                        </p:par>
+                      </p:childTnLst>
+                    </p:cTn>
+                  </p:par>
+                  <p:par>
+                    <p:cTn id="28" fill="hold">
+                      <p:stCondLst>
+                        <p:cond delay="indefinite"/>
+                      </p:stCondLst>
+                      <p:childTnLst>
+                        <p:par>
+                          <p:cTn id="29" fill="hold">
+                            <p:stCondLst>
+                              <p:cond delay="0"/>
+                            </p:stCondLst>
+                            <p:childTnLst>
+                              <p:par>
+                                <p:cTn id="30" presetID="10" presetClass="entr" presetSubtype="0" fill="hold" grpId="0" nodeType="clickEffect">
+                                  <p:stCondLst>
+                                    <p:cond delay="0"/>
+                                  </p:stCondLst>
+                                  <p:childTnLst>
+                                    <p:set>
+                                      <p:cBhvr>
+                                        <p:cTn id="31" dur="1" fill="hold">
+                                          <p:stCondLst>
+                                            <p:cond delay="0"/>
+                                          </p:stCondLst>
+                                        </p:cTn>
+                                        <p:tgtEl>
+                                          <p:spTgt spid="11">
+                                            <p:txEl>
+                                              <p:pRg st="0" end="0"/>
+                                            </p:txEl>
+                                          </p:spTgt>
+                                        </p:tgtEl>
+                                        <p:attrNameLst>
+                                          <p:attrName>style.visibility</p:attrName>
+                                        </p:attrNameLst>
+                                      </p:cBhvr>
+                                      <p:to>
+                                        <p:strVal val="visible"/>
+                                      </p:to>
+                                    </p:set>
+                                    <p:animEffect transition="in" filter="fade">
+                                      <p:cBhvr>
+                                        <p:cTn id="32" dur="500"/>
+                                        <p:tgtEl>
+                                          <p:spTgt spid="11">
+                                            <p:txEl>
+                                              <p:pRg st="0" end="0"/>
+                                            </p:txEl>
+                                          </p:spTgt>
+                                        </p:tgtEl>
+                                      </p:cBhvr>
+                                    </p:animEffect>
+                                  </p:childTnLst>
+                                </p:cTn>
+                              </p:par>
+                            </p:childTnLst>
+                          </p:cTn>
+                        </p:par>
+                      </p:childTnLst>
+                    </p:cTn>
+                  </p:par>
+                  <p:par>
+                    <p:cTn id="33" fill="hold">
+                      <p:stCondLst>
+                        <p:cond delay="indefinite"/>
+                      </p:stCondLst>
+                      <p:childTnLst>
+                        <p:par>
+                          <p:cTn id="34" fill="hold">
+                            <p:stCondLst>
+                              <p:cond delay="0"/>
+                            </p:stCondLst>
+                            <p:childTnLst>
+                              <p:par>
+                                <p:cTn id="35" presetID="10" presetClass="entr" presetSubtype="0" fill="hold" grpId="0" nodeType="clickEffect">
+                                  <p:stCondLst>
+                                    <p:cond delay="0"/>
+                                  </p:stCondLst>
+                                  <p:childTnLst>
+                                    <p:set>
+                                      <p:cBhvr>
+                                        <p:cTn id="36" dur="1" fill="hold">
+                                          <p:stCondLst>
+                                            <p:cond delay="0"/>
+                                          </p:stCondLst>
+                                        </p:cTn>
+                                        <p:tgtEl>
+                                          <p:spTgt spid="11">
+                                            <p:txEl>
+                                              <p:pRg st="1" end="1"/>
+                                            </p:txEl>
+                                          </p:spTgt>
+                                        </p:tgtEl>
+                                        <p:attrNameLst>
+                                          <p:attrName>style.visibility</p:attrName>
+                                        </p:attrNameLst>
+                                      </p:cBhvr>
+                                      <p:to>
+                                        <p:strVal val="visible"/>
+                                      </p:to>
+                                    </p:set>
+                                    <p:animEffect transition="in" filter="fade">
+                                      <p:cBhvr>
+                                        <p:cTn id="37" dur="500"/>
+                                        <p:tgtEl>
+                                          <p:spTgt spid="11">
+                                            <p:txEl>
+                                              <p:pRg st="1" end="1"/>
+                                            </p:txEl>
+                                          </p:spTgt>
+                                        </p:tgtEl>
+                                      </p:cBhvr>
+                                    </p:animEffect>
+                                  </p:childTnLst>
+                                </p:cTn>
+                              </p:par>
+                            </p:childTnLst>
+                          </p:cTn>
+                        </p:par>
+                      </p:childTnLst>
+                    </p:cTn>
+                  </p:par>
+                </p:childTnLst>
+              </p:cTn>
+              <p:prevCondLst>
+                <p:cond evt="onPrev" delay="0">
+                  <p:tgtEl>
+                    <p:sldTgt/>
+                  </p:tgtEl>
+                </p:cond>
+              </p:prevCondLst>
+              <p:nextCondLst>
+                <p:cond evt="onNext" delay="0">
+                  <p:tgtEl>
+                    <p:sldTgt/>
+                  </p:tgtEl>
+                </p:cond>
+              </p:nextCondLst>
+            </p:seq>
+          </p:childTnLst>
+        </p:cTn>
+      </p:par>
+    </p:tnLst>
+    <p:bldLst>
+      <p:bldP spid="8" grpId="0" build="p"/>
+      <p:bldP spid="9" grpId="0" build="p"/>
+      <p:bldP spid="10" grpId="0" build="p"/>
+      <p:bldP spid="11" grpId="0" build="p"/>
+    </p:bldLst>
+  </p:timing>
 </p:sld>
 </file>
 

</xml_diff>

<commit_message>
Video eingefügt in die PP
</commit_message>
<xml_diff>
--- a/Praktikumsbericht/Abschlusspraesentation.pptx
+++ b/Praktikumsbericht/Abschlusspraesentation.pptx
@@ -5,7 +5,7 @@
     <p:sldMasterId id="2147483648" r:id="rId1"/>
   </p:sldMasterIdLst>
   <p:notesMasterIdLst>
-    <p:notesMasterId r:id="rId17"/>
+    <p:notesMasterId r:id="rId18"/>
   </p:notesMasterIdLst>
   <p:sldIdLst>
     <p:sldId id="257" r:id="rId2"/>
@@ -22,7 +22,8 @@
     <p:sldId id="272" r:id="rId13"/>
     <p:sldId id="273" r:id="rId14"/>
     <p:sldId id="260" r:id="rId15"/>
-    <p:sldId id="263" r:id="rId16"/>
+    <p:sldId id="274" r:id="rId16"/>
+    <p:sldId id="263" r:id="rId17"/>
   </p:sldIdLst>
   <p:sldSz cx="12192000" cy="6858000"/>
   <p:notesSz cx="6858000" cy="9144000"/>
@@ -1352,7 +1353,7 @@
           <a:p>
             <a:fld id="{742BFD6F-DD94-4948-BBA6-AD5AE625A179}" type="slidenum">
               <a:rPr lang="de-DE" smtClean="0"/>
-              <a:t>15</a:t>
+              <a:t>16</a:t>
             </a:fld>
             <a:endParaRPr lang="de-DE"/>
           </a:p>
@@ -6862,46 +6863,20 @@
             <a:spLocks noGrp="1"/>
           </p:cNvSpPr>
           <p:nvPr>
-            <p:ph type="title"/>
+            <p:ph type="ctrTitle"/>
           </p:nvPr>
         </p:nvSpPr>
         <p:spPr/>
         <p:txBody>
-          <a:bodyPr/>
-          <a:lstStyle/>
-          <a:p>
-            <a:r>
-              <a:rPr lang="de-DE" dirty="0"/>
+          <a:bodyPr>
+            <a:normAutofit/>
+          </a:bodyPr>
+          <a:lstStyle/>
+          <a:p>
+            <a:r>
+              <a:rPr lang="de-DE" sz="4400" dirty="0"/>
               <a:t>Demonstrationsvideo</a:t>
             </a:r>
-          </a:p>
-        </p:txBody>
-      </p:sp>
-      <p:sp>
-        <p:nvSpPr>
-          <p:cNvPr id="3" name="Inhaltsplatzhalter 2">
-            <a:extLst>
-              <a:ext uri="{FF2B5EF4-FFF2-40B4-BE49-F238E27FC236}">
-                <a16:creationId xmlns:a16="http://schemas.microsoft.com/office/drawing/2014/main" id="{E63335F3-BD23-435A-8EA0-C93C54AF31BE}"/>
-              </a:ext>
-            </a:extLst>
-          </p:cNvPr>
-          <p:cNvSpPr>
-            <a:spLocks noGrp="1"/>
-          </p:cNvSpPr>
-          <p:nvPr>
-            <p:ph idx="1"/>
-          </p:nvPr>
-        </p:nvSpPr>
-        <p:spPr/>
-        <p:txBody>
-          <a:bodyPr/>
-          <a:lstStyle/>
-          <a:p>
-            <a:pPr marL="0" indent="0">
-              <a:buNone/>
-            </a:pPr>
-            <a:endParaRPr lang="de-DE" dirty="0"/>
           </a:p>
         </p:txBody>
       </p:sp>
@@ -6919,6 +6894,207 @@
 </file>
 
 <file path=ppt/slides/slide15.xml><?xml version="1.0" encoding="utf-8"?>
+<p:sld xmlns:a="http://schemas.openxmlformats.org/drawingml/2006/main" xmlns:r="http://schemas.openxmlformats.org/officeDocument/2006/relationships" xmlns:p="http://schemas.openxmlformats.org/presentationml/2006/main">
+  <p:cSld>
+    <p:spTree>
+      <p:nvGrpSpPr>
+        <p:cNvPr id="1" name=""/>
+        <p:cNvGrpSpPr/>
+        <p:nvPr/>
+      </p:nvGrpSpPr>
+      <p:grpSpPr>
+        <a:xfrm>
+          <a:off x="0" y="0"/>
+          <a:ext cx="0" cy="0"/>
+          <a:chOff x="0" y="0"/>
+          <a:chExt cx="0" cy="0"/>
+        </a:xfrm>
+      </p:grpSpPr>
+      <p:pic>
+        <p:nvPicPr>
+          <p:cNvPr id="4" name="Projekt Showcase">
+            <a:hlinkClick r:id="" action="ppaction://media"/>
+            <a:extLst>
+              <a:ext uri="{FF2B5EF4-FFF2-40B4-BE49-F238E27FC236}">
+                <a16:creationId xmlns:a16="http://schemas.microsoft.com/office/drawing/2014/main" id="{8132DD8D-7F19-4DBF-A6AF-DCE0055B99D5}"/>
+              </a:ext>
+            </a:extLst>
+          </p:cNvPr>
+          <p:cNvPicPr>
+            <a:picLocks noGrp="1" noChangeAspect="1"/>
+          </p:cNvPicPr>
+          <p:nvPr>
+            <p:ph idx="1"/>
+            <a:videoFile r:link="rId2"/>
+            <p:extLst>
+              <p:ext uri="{DAA4B4D4-6D71-4841-9C94-3DE7FCFB9230}">
+                <p14:media xmlns:p14="http://schemas.microsoft.com/office/powerpoint/2010/main" r:embed="rId1"/>
+              </p:ext>
+            </p:extLst>
+          </p:nvPr>
+        </p:nvPicPr>
+        <p:blipFill>
+          <a:blip r:embed="rId4"/>
+          <a:stretch>
+            <a:fillRect/>
+          </a:stretch>
+        </p:blipFill>
+        <p:spPr>
+          <a:xfrm>
+            <a:off x="0" y="78"/>
+            <a:ext cx="12192139" cy="6857922"/>
+          </a:xfrm>
+        </p:spPr>
+      </p:pic>
+    </p:spTree>
+    <p:extLst>
+      <p:ext uri="{BB962C8B-B14F-4D97-AF65-F5344CB8AC3E}">
+        <p14:creationId xmlns:p14="http://schemas.microsoft.com/office/powerpoint/2010/main" val="197756572"/>
+      </p:ext>
+    </p:extLst>
+  </p:cSld>
+  <p:clrMapOvr>
+    <a:masterClrMapping/>
+  </p:clrMapOvr>
+  <p:timing>
+    <p:tnLst>
+      <p:par>
+        <p:cTn id="1" dur="indefinite" restart="never" nodeType="tmRoot">
+          <p:childTnLst>
+            <p:seq concurrent="1" nextAc="seek">
+              <p:cTn id="2" dur="indefinite" nodeType="mainSeq">
+                <p:childTnLst>
+                  <p:par>
+                    <p:cTn id="3" fill="hold">
+                      <p:stCondLst>
+                        <p:cond delay="indefinite"/>
+                      </p:stCondLst>
+                      <p:childTnLst>
+                        <p:par>
+                          <p:cTn id="4" fill="hold">
+                            <p:stCondLst>
+                              <p:cond delay="0"/>
+                            </p:stCondLst>
+                            <p:childTnLst>
+                              <p:par>
+                                <p:cTn id="5" presetID="1" presetClass="mediacall" presetSubtype="0" fill="hold" nodeType="clickEffect">
+                                  <p:stCondLst>
+                                    <p:cond delay="0"/>
+                                  </p:stCondLst>
+                                  <p:childTnLst>
+                                    <p:cmd type="call" cmd="playFrom(0.0)">
+                                      <p:cBhvr>
+                                        <p:cTn id="6" dur="48251" fill="hold"/>
+                                        <p:tgtEl>
+                                          <p:spTgt spid="4"/>
+                                        </p:tgtEl>
+                                      </p:cBhvr>
+                                    </p:cmd>
+                                  </p:childTnLst>
+                                </p:cTn>
+                              </p:par>
+                            </p:childTnLst>
+                          </p:cTn>
+                        </p:par>
+                      </p:childTnLst>
+                    </p:cTn>
+                  </p:par>
+                </p:childTnLst>
+              </p:cTn>
+              <p:prevCondLst>
+                <p:cond evt="onPrev" delay="0">
+                  <p:tgtEl>
+                    <p:sldTgt/>
+                  </p:tgtEl>
+                </p:cond>
+              </p:prevCondLst>
+              <p:nextCondLst>
+                <p:cond evt="onNext" delay="0">
+                  <p:tgtEl>
+                    <p:sldTgt/>
+                  </p:tgtEl>
+                </p:cond>
+              </p:nextCondLst>
+            </p:seq>
+            <p:video>
+              <p:cMediaNode vol="80000">
+                <p:cTn id="7" fill="hold" display="0">
+                  <p:stCondLst>
+                    <p:cond delay="indefinite"/>
+                  </p:stCondLst>
+                </p:cTn>
+                <p:tgtEl>
+                  <p:spTgt spid="4"/>
+                </p:tgtEl>
+              </p:cMediaNode>
+            </p:video>
+            <p:seq concurrent="1" nextAc="seek">
+              <p:cTn id="8" restart="whenNotActive" fill="hold" evtFilter="cancelBubble" nodeType="interactiveSeq">
+                <p:stCondLst>
+                  <p:cond evt="onClick" delay="0">
+                    <p:tgtEl>
+                      <p:spTgt spid="4"/>
+                    </p:tgtEl>
+                  </p:cond>
+                </p:stCondLst>
+                <p:endSync evt="end" delay="0">
+                  <p:rtn val="all"/>
+                </p:endSync>
+                <p:childTnLst>
+                  <p:par>
+                    <p:cTn id="9" fill="hold">
+                      <p:stCondLst>
+                        <p:cond delay="0"/>
+                      </p:stCondLst>
+                      <p:childTnLst>
+                        <p:par>
+                          <p:cTn id="10" fill="hold">
+                            <p:stCondLst>
+                              <p:cond delay="0"/>
+                            </p:stCondLst>
+                            <p:childTnLst>
+                              <p:par>
+                                <p:cTn id="11" presetID="2" presetClass="mediacall" presetSubtype="0" fill="hold" nodeType="clickEffect">
+                                  <p:stCondLst>
+                                    <p:cond delay="0"/>
+                                  </p:stCondLst>
+                                  <p:childTnLst>
+                                    <p:cmd type="call" cmd="togglePause">
+                                      <p:cBhvr>
+                                        <p:cTn id="12" dur="1" fill="hold"/>
+                                        <p:tgtEl>
+                                          <p:spTgt spid="4"/>
+                                        </p:tgtEl>
+                                      </p:cBhvr>
+                                    </p:cmd>
+                                  </p:childTnLst>
+                                </p:cTn>
+                              </p:par>
+                            </p:childTnLst>
+                          </p:cTn>
+                        </p:par>
+                      </p:childTnLst>
+                    </p:cTn>
+                  </p:par>
+                </p:childTnLst>
+              </p:cTn>
+              <p:nextCondLst>
+                <p:cond evt="onClick" delay="0">
+                  <p:tgtEl>
+                    <p:spTgt spid="4"/>
+                  </p:tgtEl>
+                </p:cond>
+              </p:nextCondLst>
+            </p:seq>
+          </p:childTnLst>
+        </p:cTn>
+      </p:par>
+    </p:tnLst>
+  </p:timing>
+</p:sld>
+</file>
+
+<file path=ppt/slides/slide16.xml><?xml version="1.0" encoding="utf-8"?>
 <p:sld xmlns:a="http://schemas.openxmlformats.org/drawingml/2006/main" xmlns:r="http://schemas.openxmlformats.org/officeDocument/2006/relationships" xmlns:p="http://schemas.openxmlformats.org/presentationml/2006/main">
   <p:cSld>
     <p:spTree>

</xml_diff>